<commit_message>
Aktualisiere Code und Präsentation in Python_Kursmaterial
</commit_message>
<xml_diff>
--- a/Python_Kursmaterial/Kurs_Präsentation.pptx
+++ b/Python_Kursmaterial/Kurs_Präsentation.pptx
@@ -5,7 +5,7 @@
     <p:sldMasterId id="2147483648" r:id="rId1"/>
   </p:sldMasterIdLst>
   <p:notesMasterIdLst>
-    <p:notesMasterId r:id="rId27"/>
+    <p:notesMasterId r:id="rId31"/>
   </p:notesMasterIdLst>
   <p:sldIdLst>
     <p:sldId id="266" r:id="rId2"/>
@@ -27,12 +27,16 @@
     <p:sldId id="257" r:id="rId18"/>
     <p:sldId id="259" r:id="rId19"/>
     <p:sldId id="278" r:id="rId20"/>
-    <p:sldId id="283" r:id="rId21"/>
-    <p:sldId id="297" r:id="rId22"/>
-    <p:sldId id="298" r:id="rId23"/>
-    <p:sldId id="296" r:id="rId24"/>
-    <p:sldId id="295" r:id="rId25"/>
-    <p:sldId id="285" r:id="rId26"/>
+    <p:sldId id="303" r:id="rId21"/>
+    <p:sldId id="302" r:id="rId22"/>
+    <p:sldId id="283" r:id="rId23"/>
+    <p:sldId id="297" r:id="rId24"/>
+    <p:sldId id="298" r:id="rId25"/>
+    <p:sldId id="296" r:id="rId26"/>
+    <p:sldId id="295" r:id="rId27"/>
+    <p:sldId id="285" r:id="rId28"/>
+    <p:sldId id="300" r:id="rId29"/>
+    <p:sldId id="301" r:id="rId30"/>
   </p:sldIdLst>
   <p:sldSz cx="12192000" cy="6858000"/>
   <p:notesSz cx="6858000" cy="9144000"/>
@@ -13117,7 +13121,7 @@
           <a:p>
             <a:fld id="{FD2F298E-BE73-43C5-8794-A5E8A7E8EB8D}" type="datetimeFigureOut">
               <a:rPr lang="de-DE" smtClean="0"/>
-              <a:t>05.06.2025</a:t>
+              <a:t>10.06.2025</a:t>
             </a:fld>
             <a:endParaRPr lang="de-DE"/>
           </a:p>
@@ -13531,7 +13535,7 @@
           <a:p>
             <a:fld id="{3C1CB188-0345-4B1F-9273-072FEEF86654}" type="datetimeFigureOut">
               <a:rPr lang="de-DE" smtClean="0"/>
-              <a:t>05.06.2025</a:t>
+              <a:t>10.06.2025</a:t>
             </a:fld>
             <a:endParaRPr lang="de-DE"/>
           </a:p>
@@ -13729,7 +13733,7 @@
           <a:p>
             <a:fld id="{3C1CB188-0345-4B1F-9273-072FEEF86654}" type="datetimeFigureOut">
               <a:rPr lang="de-DE" smtClean="0"/>
-              <a:t>05.06.2025</a:t>
+              <a:t>10.06.2025</a:t>
             </a:fld>
             <a:endParaRPr lang="de-DE"/>
           </a:p>
@@ -13937,7 +13941,7 @@
           <a:p>
             <a:fld id="{3C1CB188-0345-4B1F-9273-072FEEF86654}" type="datetimeFigureOut">
               <a:rPr lang="de-DE" smtClean="0"/>
-              <a:t>05.06.2025</a:t>
+              <a:t>10.06.2025</a:t>
             </a:fld>
             <a:endParaRPr lang="de-DE"/>
           </a:p>
@@ -14135,7 +14139,7 @@
           <a:p>
             <a:fld id="{3C1CB188-0345-4B1F-9273-072FEEF86654}" type="datetimeFigureOut">
               <a:rPr lang="de-DE" smtClean="0"/>
-              <a:t>05.06.2025</a:t>
+              <a:t>10.06.2025</a:t>
             </a:fld>
             <a:endParaRPr lang="de-DE"/>
           </a:p>
@@ -14410,7 +14414,7 @@
           <a:p>
             <a:fld id="{3C1CB188-0345-4B1F-9273-072FEEF86654}" type="datetimeFigureOut">
               <a:rPr lang="de-DE" smtClean="0"/>
-              <a:t>05.06.2025</a:t>
+              <a:t>10.06.2025</a:t>
             </a:fld>
             <a:endParaRPr lang="de-DE"/>
           </a:p>
@@ -14675,7 +14679,7 @@
           <a:p>
             <a:fld id="{3C1CB188-0345-4B1F-9273-072FEEF86654}" type="datetimeFigureOut">
               <a:rPr lang="de-DE" smtClean="0"/>
-              <a:t>05.06.2025</a:t>
+              <a:t>10.06.2025</a:t>
             </a:fld>
             <a:endParaRPr lang="de-DE"/>
           </a:p>
@@ -15087,7 +15091,7 @@
           <a:p>
             <a:fld id="{3C1CB188-0345-4B1F-9273-072FEEF86654}" type="datetimeFigureOut">
               <a:rPr lang="de-DE" smtClean="0"/>
-              <a:t>05.06.2025</a:t>
+              <a:t>10.06.2025</a:t>
             </a:fld>
             <a:endParaRPr lang="de-DE"/>
           </a:p>
@@ -15228,7 +15232,7 @@
           <a:p>
             <a:fld id="{3C1CB188-0345-4B1F-9273-072FEEF86654}" type="datetimeFigureOut">
               <a:rPr lang="de-DE" smtClean="0"/>
-              <a:t>05.06.2025</a:t>
+              <a:t>10.06.2025</a:t>
             </a:fld>
             <a:endParaRPr lang="de-DE"/>
           </a:p>
@@ -15341,7 +15345,7 @@
           <a:p>
             <a:fld id="{3C1CB188-0345-4B1F-9273-072FEEF86654}" type="datetimeFigureOut">
               <a:rPr lang="de-DE" smtClean="0"/>
-              <a:t>05.06.2025</a:t>
+              <a:t>10.06.2025</a:t>
             </a:fld>
             <a:endParaRPr lang="de-DE"/>
           </a:p>
@@ -15652,7 +15656,7 @@
           <a:p>
             <a:fld id="{3C1CB188-0345-4B1F-9273-072FEEF86654}" type="datetimeFigureOut">
               <a:rPr lang="de-DE" smtClean="0"/>
-              <a:t>05.06.2025</a:t>
+              <a:t>10.06.2025</a:t>
             </a:fld>
             <a:endParaRPr lang="de-DE"/>
           </a:p>
@@ -15940,7 +15944,7 @@
           <a:p>
             <a:fld id="{3C1CB188-0345-4B1F-9273-072FEEF86654}" type="datetimeFigureOut">
               <a:rPr lang="de-DE" smtClean="0"/>
-              <a:t>05.06.2025</a:t>
+              <a:t>10.06.2025</a:t>
             </a:fld>
             <a:endParaRPr lang="de-DE"/>
           </a:p>
@@ -16181,7 +16185,7 @@
           <a:p>
             <a:fld id="{3C1CB188-0345-4B1F-9273-072FEEF86654}" type="datetimeFigureOut">
               <a:rPr lang="de-DE" smtClean="0"/>
-              <a:t>05.06.2025</a:t>
+              <a:t>10.06.2025</a:t>
             </a:fld>
             <a:endParaRPr lang="de-DE"/>
           </a:p>
@@ -20395,7 +20399,7 @@
             </a:r>
             <a:r>
               <a:rPr lang="de-DE" sz="1200" dirty="0"/>
-              <a:t>..</a:t>
+              <a:t>…</a:t>
             </a:r>
           </a:p>
           <a:p>
@@ -24533,6 +24537,604 @@
 <file path=ppt/slides/slide20.xml><?xml version="1.0" encoding="utf-8"?>
 <p:sld xmlns:a="http://schemas.openxmlformats.org/drawingml/2006/main" xmlns:r="http://schemas.openxmlformats.org/officeDocument/2006/relationships" xmlns:p="http://schemas.openxmlformats.org/presentationml/2006/main">
   <p:cSld>
+    <p:spTree>
+      <p:nvGrpSpPr>
+        <p:cNvPr id="1" name=""/>
+        <p:cNvGrpSpPr/>
+        <p:nvPr/>
+      </p:nvGrpSpPr>
+      <p:grpSpPr>
+        <a:xfrm>
+          <a:off x="0" y="0"/>
+          <a:ext cx="0" cy="0"/>
+          <a:chOff x="0" y="0"/>
+          <a:chExt cx="0" cy="0"/>
+        </a:xfrm>
+      </p:grpSpPr>
+      <p:sp>
+        <p:nvSpPr>
+          <p:cNvPr id="2" name="Titel 1">
+            <a:extLst>
+              <a:ext uri="{FF2B5EF4-FFF2-40B4-BE49-F238E27FC236}">
+                <a16:creationId xmlns:a16="http://schemas.microsoft.com/office/drawing/2014/main" id="{C0123291-990E-03A1-00DD-07FD8ED504BF}"/>
+              </a:ext>
+            </a:extLst>
+          </p:cNvPr>
+          <p:cNvSpPr>
+            <a:spLocks noGrp="1"/>
+          </p:cNvSpPr>
+          <p:nvPr>
+            <p:ph type="title"/>
+          </p:nvPr>
+        </p:nvSpPr>
+        <p:spPr/>
+        <p:txBody>
+          <a:bodyPr/>
+          <a:lstStyle/>
+          <a:p>
+            <a:endParaRPr lang="de-DE"/>
+          </a:p>
+        </p:txBody>
+      </p:sp>
+      <p:pic>
+        <p:nvPicPr>
+          <p:cNvPr id="5" name="Inhaltsplatzhalter 4" descr="Ein Bild, das Text, Screenshot, Schrift, Diagramm enthält.&#10;&#10;KI-generierte Inhalte können fehlerhaft sein.">
+            <a:extLst>
+              <a:ext uri="{FF2B5EF4-FFF2-40B4-BE49-F238E27FC236}">
+                <a16:creationId xmlns:a16="http://schemas.microsoft.com/office/drawing/2014/main" id="{A7F35FFA-6AC5-FF24-0DEB-FC5170408DDC}"/>
+              </a:ext>
+            </a:extLst>
+          </p:cNvPr>
+          <p:cNvPicPr>
+            <a:picLocks noGrp="1" noChangeAspect="1"/>
+          </p:cNvPicPr>
+          <p:nvPr>
+            <p:ph idx="1"/>
+          </p:nvPr>
+        </p:nvPicPr>
+        <p:blipFill>
+          <a:blip r:embed="rId2">
+            <a:extLst>
+              <a:ext uri="{28A0092B-C50C-407E-A947-70E740481C1C}">
+                <a14:useLocalDpi xmlns:a14="http://schemas.microsoft.com/office/drawing/2010/main" val="0"/>
+              </a:ext>
+            </a:extLst>
+          </a:blip>
+          <a:stretch>
+            <a:fillRect/>
+          </a:stretch>
+        </p:blipFill>
+        <p:spPr>
+          <a:xfrm>
+            <a:off x="2886558" y="365125"/>
+            <a:ext cx="5894227" cy="5140759"/>
+          </a:xfrm>
+        </p:spPr>
+      </p:pic>
+      <p:sp>
+        <p:nvSpPr>
+          <p:cNvPr id="6" name="Textfeld 5">
+            <a:extLst>
+              <a:ext uri="{FF2B5EF4-FFF2-40B4-BE49-F238E27FC236}">
+                <a16:creationId xmlns:a16="http://schemas.microsoft.com/office/drawing/2014/main" id="{7570F54F-EFB4-FBA3-62E7-156F1099B00C}"/>
+              </a:ext>
+            </a:extLst>
+          </p:cNvPr>
+          <p:cNvSpPr txBox="1"/>
+          <p:nvPr/>
+        </p:nvSpPr>
+        <p:spPr>
+          <a:xfrm>
+            <a:off x="4557010" y="5613816"/>
+            <a:ext cx="4347147" cy="276999"/>
+          </a:xfrm>
+          <a:prstGeom prst="rect">
+            <a:avLst/>
+          </a:prstGeom>
+          <a:noFill/>
+        </p:spPr>
+        <p:txBody>
+          <a:bodyPr wrap="square" rtlCol="0">
+            <a:spAutoFit/>
+          </a:bodyPr>
+          <a:lstStyle/>
+          <a:p>
+            <a:r>
+              <a:rPr lang="de-DE" sz="1200" dirty="0"/>
+              <a:t>https://pynative.com/python-data-types/</a:t>
+            </a:r>
+          </a:p>
+        </p:txBody>
+      </p:sp>
+    </p:spTree>
+    <p:extLst>
+      <p:ext uri="{BB962C8B-B14F-4D97-AF65-F5344CB8AC3E}">
+        <p14:creationId xmlns:p14="http://schemas.microsoft.com/office/powerpoint/2010/main" val="1259770168"/>
+      </p:ext>
+    </p:extLst>
+  </p:cSld>
+  <p:clrMapOvr>
+    <a:masterClrMapping/>
+  </p:clrMapOvr>
+</p:sld>
+</file>
+
+<file path=ppt/slides/slide21.xml><?xml version="1.0" encoding="utf-8"?>
+<p:sld xmlns:a="http://schemas.openxmlformats.org/drawingml/2006/main" xmlns:r="http://schemas.openxmlformats.org/officeDocument/2006/relationships" xmlns:p="http://schemas.openxmlformats.org/presentationml/2006/main">
+  <p:cSld>
+    <p:spTree>
+      <p:nvGrpSpPr>
+        <p:cNvPr id="1" name=""/>
+        <p:cNvGrpSpPr/>
+        <p:nvPr/>
+      </p:nvGrpSpPr>
+      <p:grpSpPr>
+        <a:xfrm>
+          <a:off x="0" y="0"/>
+          <a:ext cx="0" cy="0"/>
+          <a:chOff x="0" y="0"/>
+          <a:chExt cx="0" cy="0"/>
+        </a:xfrm>
+      </p:grpSpPr>
+      <p:sp>
+        <p:nvSpPr>
+          <p:cNvPr id="2" name="Titel 1">
+            <a:extLst>
+              <a:ext uri="{FF2B5EF4-FFF2-40B4-BE49-F238E27FC236}">
+                <a16:creationId xmlns:a16="http://schemas.microsoft.com/office/drawing/2014/main" id="{12A1B24C-E00B-CD6F-AA2C-4B8C0C3B40FB}"/>
+              </a:ext>
+            </a:extLst>
+          </p:cNvPr>
+          <p:cNvSpPr>
+            <a:spLocks noGrp="1"/>
+          </p:cNvSpPr>
+          <p:nvPr>
+            <p:ph type="title"/>
+          </p:nvPr>
+        </p:nvSpPr>
+        <p:spPr/>
+        <p:txBody>
+          <a:bodyPr/>
+          <a:lstStyle/>
+          <a:p>
+            <a:endParaRPr lang="de-DE" dirty="0"/>
+          </a:p>
+        </p:txBody>
+      </p:sp>
+      <p:pic>
+        <p:nvPicPr>
+          <p:cNvPr id="5" name="Inhaltsplatzhalter 4" descr="Ein Bild, das Text, Frucht, Screenshot, Naturkost enthält.&#10;&#10;KI-generierte Inhalte können fehlerhaft sein.">
+            <a:extLst>
+              <a:ext uri="{FF2B5EF4-FFF2-40B4-BE49-F238E27FC236}">
+                <a16:creationId xmlns:a16="http://schemas.microsoft.com/office/drawing/2014/main" id="{59996A79-4156-B63F-989C-7809352B7BE8}"/>
+              </a:ext>
+            </a:extLst>
+          </p:cNvPr>
+          <p:cNvPicPr>
+            <a:picLocks noGrp="1" noChangeAspect="1"/>
+          </p:cNvPicPr>
+          <p:nvPr>
+            <p:ph idx="1"/>
+          </p:nvPr>
+        </p:nvPicPr>
+        <p:blipFill>
+          <a:blip r:embed="rId2">
+            <a:extLst>
+              <a:ext uri="{28A0092B-C50C-407E-A947-70E740481C1C}">
+                <a14:useLocalDpi xmlns:a14="http://schemas.microsoft.com/office/drawing/2010/main" val="0"/>
+              </a:ext>
+            </a:extLst>
+          </a:blip>
+          <a:stretch>
+            <a:fillRect/>
+          </a:stretch>
+        </p:blipFill>
+        <p:spPr>
+          <a:xfrm>
+            <a:off x="1324619" y="1027906"/>
+            <a:ext cx="4351338" cy="4351338"/>
+          </a:xfrm>
+        </p:spPr>
+      </p:pic>
+      <p:sp>
+        <p:nvSpPr>
+          <p:cNvPr id="8" name="Rechteck 7">
+            <a:extLst>
+              <a:ext uri="{FF2B5EF4-FFF2-40B4-BE49-F238E27FC236}">
+                <a16:creationId xmlns:a16="http://schemas.microsoft.com/office/drawing/2014/main" id="{15F9F29E-71C5-0265-AFE5-0B2323F60F7D}"/>
+              </a:ext>
+            </a:extLst>
+          </p:cNvPr>
+          <p:cNvSpPr/>
+          <p:nvPr/>
+        </p:nvSpPr>
+        <p:spPr>
+          <a:xfrm>
+            <a:off x="6216693" y="2651146"/>
+            <a:ext cx="1190561" cy="478680"/>
+          </a:xfrm>
+          <a:prstGeom prst="rect">
+            <a:avLst/>
+          </a:prstGeom>
+          <a:solidFill>
+            <a:schemeClr val="accent2">
+              <a:lumMod val="20000"/>
+              <a:lumOff val="80000"/>
+            </a:schemeClr>
+          </a:solidFill>
+        </p:spPr>
+        <p:style>
+          <a:lnRef idx="2">
+            <a:schemeClr val="accent1">
+              <a:shade val="15000"/>
+            </a:schemeClr>
+          </a:lnRef>
+          <a:fillRef idx="1">
+            <a:schemeClr val="accent1"/>
+          </a:fillRef>
+          <a:effectRef idx="0">
+            <a:schemeClr val="accent1"/>
+          </a:effectRef>
+          <a:fontRef idx="minor">
+            <a:schemeClr val="lt1"/>
+          </a:fontRef>
+        </p:style>
+        <p:txBody>
+          <a:bodyPr rtlCol="0" anchor="ctr"/>
+          <a:lstStyle/>
+          <a:p>
+            <a:pPr algn="ctr"/>
+            <a:endParaRPr lang="de-DE"/>
+          </a:p>
+        </p:txBody>
+      </p:sp>
+      <p:sp>
+        <p:nvSpPr>
+          <p:cNvPr id="9" name="Rechteck 8">
+            <a:extLst>
+              <a:ext uri="{FF2B5EF4-FFF2-40B4-BE49-F238E27FC236}">
+                <a16:creationId xmlns:a16="http://schemas.microsoft.com/office/drawing/2014/main" id="{26961E4A-1FC1-5029-2937-FB1FEC2235F5}"/>
+              </a:ext>
+            </a:extLst>
+          </p:cNvPr>
+          <p:cNvSpPr/>
+          <p:nvPr/>
+        </p:nvSpPr>
+        <p:spPr>
+          <a:xfrm>
+            <a:off x="7407254" y="2651146"/>
+            <a:ext cx="1190561" cy="478680"/>
+          </a:xfrm>
+          <a:prstGeom prst="rect">
+            <a:avLst/>
+          </a:prstGeom>
+          <a:solidFill>
+            <a:schemeClr val="accent2">
+              <a:lumMod val="20000"/>
+              <a:lumOff val="80000"/>
+            </a:schemeClr>
+          </a:solidFill>
+        </p:spPr>
+        <p:style>
+          <a:lnRef idx="2">
+            <a:schemeClr val="accent1">
+              <a:shade val="15000"/>
+            </a:schemeClr>
+          </a:lnRef>
+          <a:fillRef idx="1">
+            <a:schemeClr val="accent1"/>
+          </a:fillRef>
+          <a:effectRef idx="0">
+            <a:schemeClr val="accent1"/>
+          </a:effectRef>
+          <a:fontRef idx="minor">
+            <a:schemeClr val="lt1"/>
+          </a:fontRef>
+        </p:style>
+        <p:txBody>
+          <a:bodyPr rtlCol="0" anchor="ctr"/>
+          <a:lstStyle/>
+          <a:p>
+            <a:pPr algn="ctr"/>
+            <a:endParaRPr lang="de-DE"/>
+          </a:p>
+        </p:txBody>
+      </p:sp>
+      <p:sp>
+        <p:nvSpPr>
+          <p:cNvPr id="10" name="Rechteck 9">
+            <a:extLst>
+              <a:ext uri="{FF2B5EF4-FFF2-40B4-BE49-F238E27FC236}">
+                <a16:creationId xmlns:a16="http://schemas.microsoft.com/office/drawing/2014/main" id="{2CACF90F-9725-E385-4E55-B5784116F1C6}"/>
+              </a:ext>
+            </a:extLst>
+          </p:cNvPr>
+          <p:cNvSpPr/>
+          <p:nvPr/>
+        </p:nvSpPr>
+        <p:spPr>
+          <a:xfrm>
+            <a:off x="8597815" y="2651146"/>
+            <a:ext cx="1190561" cy="478680"/>
+          </a:xfrm>
+          <a:prstGeom prst="rect">
+            <a:avLst/>
+          </a:prstGeom>
+          <a:solidFill>
+            <a:schemeClr val="accent2">
+              <a:lumMod val="20000"/>
+              <a:lumOff val="80000"/>
+            </a:schemeClr>
+          </a:solidFill>
+        </p:spPr>
+        <p:style>
+          <a:lnRef idx="2">
+            <a:schemeClr val="accent1">
+              <a:shade val="15000"/>
+            </a:schemeClr>
+          </a:lnRef>
+          <a:fillRef idx="1">
+            <a:schemeClr val="accent1"/>
+          </a:fillRef>
+          <a:effectRef idx="0">
+            <a:schemeClr val="accent1"/>
+          </a:effectRef>
+          <a:fontRef idx="minor">
+            <a:schemeClr val="lt1"/>
+          </a:fontRef>
+        </p:style>
+        <p:txBody>
+          <a:bodyPr rtlCol="0" anchor="ctr"/>
+          <a:lstStyle/>
+          <a:p>
+            <a:pPr algn="ctr"/>
+            <a:endParaRPr lang="de-DE"/>
+          </a:p>
+        </p:txBody>
+      </p:sp>
+      <p:sp>
+        <p:nvSpPr>
+          <p:cNvPr id="11" name="Rechteck 10">
+            <a:extLst>
+              <a:ext uri="{FF2B5EF4-FFF2-40B4-BE49-F238E27FC236}">
+                <a16:creationId xmlns:a16="http://schemas.microsoft.com/office/drawing/2014/main" id="{B38F5B0A-0384-381C-8429-DE656C651D37}"/>
+              </a:ext>
+            </a:extLst>
+          </p:cNvPr>
+          <p:cNvSpPr/>
+          <p:nvPr/>
+        </p:nvSpPr>
+        <p:spPr>
+          <a:xfrm>
+            <a:off x="9788376" y="2651146"/>
+            <a:ext cx="1190561" cy="478680"/>
+          </a:xfrm>
+          <a:prstGeom prst="rect">
+            <a:avLst/>
+          </a:prstGeom>
+          <a:solidFill>
+            <a:schemeClr val="accent2">
+              <a:lumMod val="20000"/>
+              <a:lumOff val="80000"/>
+            </a:schemeClr>
+          </a:solidFill>
+        </p:spPr>
+        <p:style>
+          <a:lnRef idx="2">
+            <a:schemeClr val="accent1">
+              <a:shade val="15000"/>
+            </a:schemeClr>
+          </a:lnRef>
+          <a:fillRef idx="1">
+            <a:schemeClr val="accent1"/>
+          </a:fillRef>
+          <a:effectRef idx="0">
+            <a:schemeClr val="accent1"/>
+          </a:effectRef>
+          <a:fontRef idx="minor">
+            <a:schemeClr val="lt1"/>
+          </a:fontRef>
+        </p:style>
+        <p:txBody>
+          <a:bodyPr rtlCol="0" anchor="ctr"/>
+          <a:lstStyle/>
+          <a:p>
+            <a:pPr algn="ctr"/>
+            <a:endParaRPr lang="de-DE"/>
+          </a:p>
+        </p:txBody>
+      </p:sp>
+      <p:sp>
+        <p:nvSpPr>
+          <p:cNvPr id="12" name="Textfeld 11">
+            <a:extLst>
+              <a:ext uri="{FF2B5EF4-FFF2-40B4-BE49-F238E27FC236}">
+                <a16:creationId xmlns:a16="http://schemas.microsoft.com/office/drawing/2014/main" id="{0E453EBC-9F11-3BE4-3FF9-FE7BD06449FB}"/>
+              </a:ext>
+            </a:extLst>
+          </p:cNvPr>
+          <p:cNvSpPr txBox="1"/>
+          <p:nvPr/>
+        </p:nvSpPr>
+        <p:spPr>
+          <a:xfrm>
+            <a:off x="6655482" y="2705820"/>
+            <a:ext cx="340599" cy="369332"/>
+          </a:xfrm>
+          <a:prstGeom prst="rect">
+            <a:avLst/>
+          </a:prstGeom>
+          <a:noFill/>
+        </p:spPr>
+        <p:txBody>
+          <a:bodyPr wrap="square" rtlCol="0">
+            <a:spAutoFit/>
+          </a:bodyPr>
+          <a:lstStyle/>
+          <a:p>
+            <a:r>
+              <a:rPr lang="de-DE" dirty="0"/>
+              <a:t>0</a:t>
+            </a:r>
+          </a:p>
+        </p:txBody>
+      </p:sp>
+      <p:sp>
+        <p:nvSpPr>
+          <p:cNvPr id="13" name="Textfeld 12">
+            <a:extLst>
+              <a:ext uri="{FF2B5EF4-FFF2-40B4-BE49-F238E27FC236}">
+                <a16:creationId xmlns:a16="http://schemas.microsoft.com/office/drawing/2014/main" id="{C680C78A-A9E7-7789-8CEC-827B480E82F5}"/>
+              </a:ext>
+            </a:extLst>
+          </p:cNvPr>
+          <p:cNvSpPr txBox="1"/>
+          <p:nvPr/>
+        </p:nvSpPr>
+        <p:spPr>
+          <a:xfrm>
+            <a:off x="7818427" y="2705820"/>
+            <a:ext cx="340599" cy="369332"/>
+          </a:xfrm>
+          <a:prstGeom prst="rect">
+            <a:avLst/>
+          </a:prstGeom>
+          <a:noFill/>
+        </p:spPr>
+        <p:txBody>
+          <a:bodyPr wrap="square" rtlCol="0">
+            <a:spAutoFit/>
+          </a:bodyPr>
+          <a:lstStyle/>
+          <a:p>
+            <a:r>
+              <a:rPr lang="de-DE" dirty="0"/>
+              <a:t>1</a:t>
+            </a:r>
+          </a:p>
+        </p:txBody>
+      </p:sp>
+      <p:sp>
+        <p:nvSpPr>
+          <p:cNvPr id="14" name="Textfeld 13">
+            <a:extLst>
+              <a:ext uri="{FF2B5EF4-FFF2-40B4-BE49-F238E27FC236}">
+                <a16:creationId xmlns:a16="http://schemas.microsoft.com/office/drawing/2014/main" id="{740558E7-1D66-F6C7-35B0-39ABE44DE6CA}"/>
+              </a:ext>
+            </a:extLst>
+          </p:cNvPr>
+          <p:cNvSpPr txBox="1"/>
+          <p:nvPr/>
+        </p:nvSpPr>
+        <p:spPr>
+          <a:xfrm>
+            <a:off x="9008988" y="2705820"/>
+            <a:ext cx="340599" cy="369332"/>
+          </a:xfrm>
+          <a:prstGeom prst="rect">
+            <a:avLst/>
+          </a:prstGeom>
+          <a:noFill/>
+        </p:spPr>
+        <p:txBody>
+          <a:bodyPr wrap="square" rtlCol="0">
+            <a:spAutoFit/>
+          </a:bodyPr>
+          <a:lstStyle/>
+          <a:p>
+            <a:r>
+              <a:rPr lang="de-DE" dirty="0"/>
+              <a:t>2</a:t>
+            </a:r>
+          </a:p>
+        </p:txBody>
+      </p:sp>
+      <p:sp>
+        <p:nvSpPr>
+          <p:cNvPr id="15" name="Textfeld 14">
+            <a:extLst>
+              <a:ext uri="{FF2B5EF4-FFF2-40B4-BE49-F238E27FC236}">
+                <a16:creationId xmlns:a16="http://schemas.microsoft.com/office/drawing/2014/main" id="{D098AE86-F805-E760-B00D-9338A9B994FC}"/>
+              </a:ext>
+            </a:extLst>
+          </p:cNvPr>
+          <p:cNvSpPr txBox="1"/>
+          <p:nvPr/>
+        </p:nvSpPr>
+        <p:spPr>
+          <a:xfrm>
+            <a:off x="10227165" y="2705820"/>
+            <a:ext cx="340599" cy="369332"/>
+          </a:xfrm>
+          <a:prstGeom prst="rect">
+            <a:avLst/>
+          </a:prstGeom>
+          <a:noFill/>
+        </p:spPr>
+        <p:txBody>
+          <a:bodyPr wrap="square" rtlCol="0">
+            <a:spAutoFit/>
+          </a:bodyPr>
+          <a:lstStyle/>
+          <a:p>
+            <a:r>
+              <a:rPr lang="de-DE" dirty="0"/>
+              <a:t>3</a:t>
+            </a:r>
+          </a:p>
+        </p:txBody>
+      </p:sp>
+      <p:sp>
+        <p:nvSpPr>
+          <p:cNvPr id="16" name="Textfeld 15">
+            <a:extLst>
+              <a:ext uri="{FF2B5EF4-FFF2-40B4-BE49-F238E27FC236}">
+                <a16:creationId xmlns:a16="http://schemas.microsoft.com/office/drawing/2014/main" id="{90714769-692A-1617-B651-7CB192D2C5CD}"/>
+              </a:ext>
+            </a:extLst>
+          </p:cNvPr>
+          <p:cNvSpPr txBox="1"/>
+          <p:nvPr/>
+        </p:nvSpPr>
+        <p:spPr>
+          <a:xfrm>
+            <a:off x="2454765" y="5467989"/>
+            <a:ext cx="3099141" cy="338554"/>
+          </a:xfrm>
+          <a:prstGeom prst="rect">
+            <a:avLst/>
+          </a:prstGeom>
+          <a:noFill/>
+        </p:spPr>
+        <p:txBody>
+          <a:bodyPr wrap="square" rtlCol="0">
+            <a:spAutoFit/>
+          </a:bodyPr>
+          <a:lstStyle/>
+          <a:p>
+            <a:r>
+              <a:rPr lang="de-DE" sz="800" dirty="0"/>
+              <a:t>https://devrant.com/rants/382946/cause-for-us-counting-starts-with-0-in-most-of-programming-languages</a:t>
+            </a:r>
+          </a:p>
+        </p:txBody>
+      </p:sp>
+    </p:spTree>
+    <p:extLst>
+      <p:ext uri="{BB962C8B-B14F-4D97-AF65-F5344CB8AC3E}">
+        <p14:creationId xmlns:p14="http://schemas.microsoft.com/office/powerpoint/2010/main" val="3809470403"/>
+      </p:ext>
+    </p:extLst>
+  </p:cSld>
+  <p:clrMapOvr>
+    <a:masterClrMapping/>
+  </p:clrMapOvr>
+</p:sld>
+</file>
+
+<file path=ppt/slides/slide22.xml><?xml version="1.0" encoding="utf-8"?>
+<p:sld xmlns:a="http://schemas.openxmlformats.org/drawingml/2006/main" xmlns:r="http://schemas.openxmlformats.org/officeDocument/2006/relationships" xmlns:p="http://schemas.openxmlformats.org/presentationml/2006/main">
+  <p:cSld>
     <p:bg>
       <p:bgPr>
         <a:solidFill>
@@ -25167,7 +25769,7 @@
 </p:sld>
 </file>
 
-<file path=ppt/slides/slide21.xml><?xml version="1.0" encoding="utf-8"?>
+<file path=ppt/slides/slide23.xml><?xml version="1.0" encoding="utf-8"?>
 <p:sld xmlns:a="http://schemas.openxmlformats.org/drawingml/2006/main" xmlns:r="http://schemas.openxmlformats.org/officeDocument/2006/relationships" xmlns:p="http://schemas.openxmlformats.org/presentationml/2006/main">
   <p:cSld>
     <p:bg>
@@ -25725,7 +26327,7 @@
 </p:sld>
 </file>
 
-<file path=ppt/slides/slide22.xml><?xml version="1.0" encoding="utf-8"?>
+<file path=ppt/slides/slide24.xml><?xml version="1.0" encoding="utf-8"?>
 <p:sld xmlns:a="http://schemas.openxmlformats.org/drawingml/2006/main" xmlns:r="http://schemas.openxmlformats.org/officeDocument/2006/relationships" xmlns:p="http://schemas.openxmlformats.org/presentationml/2006/main">
   <p:cSld>
     <p:spTree>
@@ -25815,7 +26417,7 @@
 </p:sld>
 </file>
 
-<file path=ppt/slides/slide23.xml><?xml version="1.0" encoding="utf-8"?>
+<file path=ppt/slides/slide25.xml><?xml version="1.0" encoding="utf-8"?>
 <p:sld xmlns:a="http://schemas.openxmlformats.org/drawingml/2006/main" xmlns:r="http://schemas.openxmlformats.org/officeDocument/2006/relationships" xmlns:p="http://schemas.openxmlformats.org/presentationml/2006/main">
   <p:cSld>
     <p:spTree>
@@ -25905,7 +26507,7 @@
 </p:sld>
 </file>
 
-<file path=ppt/slides/slide24.xml><?xml version="1.0" encoding="utf-8"?>
+<file path=ppt/slides/slide26.xml><?xml version="1.0" encoding="utf-8"?>
 <p:sld xmlns:a="http://schemas.openxmlformats.org/drawingml/2006/main" xmlns:r="http://schemas.openxmlformats.org/officeDocument/2006/relationships" xmlns:p="http://schemas.openxmlformats.org/presentationml/2006/main">
   <p:cSld>
     <p:bg>
@@ -26542,7 +27144,7 @@
 </p:sld>
 </file>
 
-<file path=ppt/slides/slide25.xml><?xml version="1.0" encoding="utf-8"?>
+<file path=ppt/slides/slide27.xml><?xml version="1.0" encoding="utf-8"?>
 <p:sld xmlns:a="http://schemas.openxmlformats.org/drawingml/2006/main" xmlns:r="http://schemas.openxmlformats.org/officeDocument/2006/relationships" xmlns:p="http://schemas.openxmlformats.org/presentationml/2006/main">
   <p:cSld>
     <p:spTree>
@@ -26713,6 +27315,773 @@
     <p:extLst>
       <p:ext uri="{BB962C8B-B14F-4D97-AF65-F5344CB8AC3E}">
         <p14:creationId xmlns:p14="http://schemas.microsoft.com/office/powerpoint/2010/main" val="2822856073"/>
+      </p:ext>
+    </p:extLst>
+  </p:cSld>
+  <p:clrMapOvr>
+    <a:masterClrMapping/>
+  </p:clrMapOvr>
+</p:sld>
+</file>
+
+<file path=ppt/slides/slide28.xml><?xml version="1.0" encoding="utf-8"?>
+<p:sld xmlns:a="http://schemas.openxmlformats.org/drawingml/2006/main" xmlns:r="http://schemas.openxmlformats.org/officeDocument/2006/relationships" xmlns:p="http://schemas.openxmlformats.org/presentationml/2006/main">
+  <p:cSld>
+    <p:bg>
+      <p:bgPr>
+        <a:solidFill>
+          <a:schemeClr val="bg1"/>
+        </a:solidFill>
+        <a:effectLst/>
+      </p:bgPr>
+    </p:bg>
+    <p:spTree>
+      <p:nvGrpSpPr>
+        <p:cNvPr id="1" name="">
+          <a:extLst>
+            <a:ext uri="{FF2B5EF4-FFF2-40B4-BE49-F238E27FC236}">
+              <a16:creationId xmlns:a16="http://schemas.microsoft.com/office/drawing/2014/main" id="{A0F38416-B0A2-5C88-362B-402A6BF95183}"/>
+            </a:ext>
+          </a:extLst>
+        </p:cNvPr>
+        <p:cNvGrpSpPr/>
+        <p:nvPr/>
+      </p:nvGrpSpPr>
+      <p:grpSpPr>
+        <a:xfrm>
+          <a:off x="0" y="0"/>
+          <a:ext cx="0" cy="0"/>
+          <a:chOff x="0" y="0"/>
+          <a:chExt cx="0" cy="0"/>
+        </a:xfrm>
+      </p:grpSpPr>
+      <p:sp useBgFill="1">
+        <p:nvSpPr>
+          <p:cNvPr id="8" name="Rectangle 7">
+            <a:extLst>
+              <a:ext uri="{FF2B5EF4-FFF2-40B4-BE49-F238E27FC236}">
+                <a16:creationId xmlns:a16="http://schemas.microsoft.com/office/drawing/2014/main" id="{50803CCA-FBF9-5845-3425-B54F9ECDDF30}"/>
+              </a:ext>
+              <a:ext uri="{C183D7F6-B498-43B3-948B-1728B52AA6E4}">
+                <adec:decorative xmlns:adec="http://schemas.microsoft.com/office/drawing/2017/decorative" val="1"/>
+              </a:ext>
+            </a:extLst>
+          </p:cNvPr>
+          <p:cNvSpPr>
+            <a:spLocks noGrp="1" noRot="1" noChangeAspect="1" noMove="1" noResize="1" noEditPoints="1" noAdjustHandles="1" noChangeArrowheads="1" noChangeShapeType="1" noTextEdit="1"/>
+          </p:cNvSpPr>
+          <p:nvPr>
+            <p:extLst>
+              <p:ext uri="{386F3935-93C4-4BCD-93E2-E3B085C9AB24}">
+                <p16:designElem xmlns:p16="http://schemas.microsoft.com/office/powerpoint/2015/main" val="1"/>
+              </p:ext>
+            </p:extLst>
+          </p:nvPr>
+        </p:nvSpPr>
+        <p:spPr>
+          <a:xfrm>
+            <a:off x="0" y="0"/>
+            <a:ext cx="12192000" cy="6858000"/>
+          </a:xfrm>
+          <a:prstGeom prst="rect">
+            <a:avLst/>
+          </a:prstGeom>
+          <a:ln w="12700" cap="flat" cmpd="sng" algn="ctr">
+            <a:noFill/>
+            <a:prstDash val="solid"/>
+            <a:miter lim="800000"/>
+          </a:ln>
+          <a:effectLst/>
+          <a:extLst>
+            <a:ext uri="{91240B29-F687-4F45-9708-019B960494DF}">
+              <a14:hiddenLine xmlns:a14="http://schemas.microsoft.com/office/drawing/2010/main" w="12700" cap="flat" cmpd="sng" algn="ctr">
+                <a:solidFill>
+                  <a:schemeClr val="accent1">
+                    <a:shade val="50000"/>
+                  </a:schemeClr>
+                </a:solidFill>
+                <a:prstDash val="solid"/>
+                <a:miter lim="800000"/>
+              </a14:hiddenLine>
+            </a:ext>
+          </a:extLst>
+        </p:spPr>
+        <p:style>
+          <a:lnRef idx="2">
+            <a:schemeClr val="accent1">
+              <a:shade val="50000"/>
+            </a:schemeClr>
+          </a:lnRef>
+          <a:fillRef idx="1">
+            <a:schemeClr val="accent1"/>
+          </a:fillRef>
+          <a:effectRef idx="0">
+            <a:schemeClr val="accent1"/>
+          </a:effectRef>
+          <a:fontRef idx="minor">
+            <a:schemeClr val="lt1"/>
+          </a:fontRef>
+        </p:style>
+        <p:txBody>
+          <a:bodyPr rtlCol="0" anchor="ctr"/>
+          <a:lstStyle/>
+          <a:p>
+            <a:pPr algn="ctr"/>
+            <a:endParaRPr lang="en-US"/>
+          </a:p>
+        </p:txBody>
+      </p:sp>
+      <p:sp>
+        <p:nvSpPr>
+          <p:cNvPr id="10" name="Rectangle 9">
+            <a:extLst>
+              <a:ext uri="{FF2B5EF4-FFF2-40B4-BE49-F238E27FC236}">
+                <a16:creationId xmlns:a16="http://schemas.microsoft.com/office/drawing/2014/main" id="{20FAAB31-2F40-8398-1D1A-CADF3396E4F3}"/>
+              </a:ext>
+              <a:ext uri="{C183D7F6-B498-43B3-948B-1728B52AA6E4}">
+                <adec:decorative xmlns:adec="http://schemas.microsoft.com/office/drawing/2017/decorative" val="1"/>
+              </a:ext>
+            </a:extLst>
+          </p:cNvPr>
+          <p:cNvSpPr>
+            <a:spLocks noGrp="1" noRot="1" noChangeAspect="1" noMove="1" noResize="1" noEditPoints="1" noAdjustHandles="1" noChangeArrowheads="1" noChangeShapeType="1" noTextEdit="1"/>
+          </p:cNvSpPr>
+          <p:nvPr>
+            <p:extLst>
+              <p:ext uri="{386F3935-93C4-4BCD-93E2-E3B085C9AB24}">
+                <p16:designElem xmlns:p16="http://schemas.microsoft.com/office/powerpoint/2015/main" val="1"/>
+              </p:ext>
+            </p:extLst>
+          </p:nvPr>
+        </p:nvSpPr>
+        <p:spPr>
+          <a:xfrm rot="10800000">
+            <a:off x="-2" y="-22693"/>
+            <a:ext cx="12191999" cy="4374129"/>
+          </a:xfrm>
+          <a:prstGeom prst="rect">
+            <a:avLst/>
+          </a:prstGeom>
+          <a:gradFill>
+            <a:gsLst>
+              <a:gs pos="0">
+                <a:schemeClr val="accent1">
+                  <a:lumMod val="75000"/>
+                </a:schemeClr>
+              </a:gs>
+              <a:gs pos="100000">
+                <a:srgbClr val="000000"/>
+              </a:gs>
+            </a:gsLst>
+            <a:lin ang="15000000" scaled="0"/>
+          </a:gradFill>
+          <a:ln>
+            <a:noFill/>
+          </a:ln>
+        </p:spPr>
+        <p:style>
+          <a:lnRef idx="2">
+            <a:schemeClr val="accent1">
+              <a:shade val="50000"/>
+            </a:schemeClr>
+          </a:lnRef>
+          <a:fillRef idx="1">
+            <a:schemeClr val="accent1"/>
+          </a:fillRef>
+          <a:effectRef idx="0">
+            <a:schemeClr val="accent1"/>
+          </a:effectRef>
+          <a:fontRef idx="minor">
+            <a:schemeClr val="lt1"/>
+          </a:fontRef>
+        </p:style>
+        <p:txBody>
+          <a:bodyPr rtlCol="0" anchor="ctr"/>
+          <a:lstStyle/>
+          <a:p>
+            <a:pPr algn="ctr"/>
+            <a:endParaRPr lang="en-US"/>
+          </a:p>
+        </p:txBody>
+      </p:sp>
+      <p:sp>
+        <p:nvSpPr>
+          <p:cNvPr id="12" name="Rectangle 11">
+            <a:extLst>
+              <a:ext uri="{FF2B5EF4-FFF2-40B4-BE49-F238E27FC236}">
+                <a16:creationId xmlns:a16="http://schemas.microsoft.com/office/drawing/2014/main" id="{3B4E8752-FC9D-CBF3-DCA6-FC8F711F37EC}"/>
+              </a:ext>
+              <a:ext uri="{C183D7F6-B498-43B3-948B-1728B52AA6E4}">
+                <adec:decorative xmlns:adec="http://schemas.microsoft.com/office/drawing/2017/decorative" val="1"/>
+              </a:ext>
+            </a:extLst>
+          </p:cNvPr>
+          <p:cNvSpPr>
+            <a:spLocks noGrp="1" noRot="1" noChangeAspect="1" noMove="1" noResize="1" noEditPoints="1" noAdjustHandles="1" noChangeArrowheads="1" noChangeShapeType="1" noTextEdit="1"/>
+          </p:cNvSpPr>
+          <p:nvPr>
+            <p:extLst>
+              <p:ext uri="{386F3935-93C4-4BCD-93E2-E3B085C9AB24}">
+                <p16:designElem xmlns:p16="http://schemas.microsoft.com/office/powerpoint/2015/main" val="1"/>
+              </p:ext>
+            </p:extLst>
+          </p:nvPr>
+        </p:nvSpPr>
+        <p:spPr>
+          <a:xfrm rot="5400000">
+            <a:off x="3908719" y="-3931841"/>
+            <a:ext cx="4374557" cy="12192000"/>
+          </a:xfrm>
+          <a:prstGeom prst="rect">
+            <a:avLst/>
+          </a:prstGeom>
+          <a:gradFill>
+            <a:gsLst>
+              <a:gs pos="40000">
+                <a:schemeClr val="accent1">
+                  <a:alpha val="0"/>
+                </a:schemeClr>
+              </a:gs>
+              <a:gs pos="100000">
+                <a:schemeClr val="accent1">
+                  <a:lumMod val="75000"/>
+                  <a:alpha val="52000"/>
+                </a:schemeClr>
+              </a:gs>
+            </a:gsLst>
+            <a:lin ang="2400000" scaled="0"/>
+          </a:gradFill>
+          <a:ln>
+            <a:noFill/>
+          </a:ln>
+        </p:spPr>
+        <p:style>
+          <a:lnRef idx="2">
+            <a:schemeClr val="accent1">
+              <a:shade val="50000"/>
+            </a:schemeClr>
+          </a:lnRef>
+          <a:fillRef idx="1">
+            <a:schemeClr val="accent1"/>
+          </a:fillRef>
+          <a:effectRef idx="0">
+            <a:schemeClr val="accent1"/>
+          </a:effectRef>
+          <a:fontRef idx="minor">
+            <a:schemeClr val="lt1"/>
+          </a:fontRef>
+        </p:style>
+        <p:txBody>
+          <a:bodyPr rtlCol="0" anchor="ctr"/>
+          <a:lstStyle/>
+          <a:p>
+            <a:pPr algn="ctr"/>
+            <a:endParaRPr lang="en-US"/>
+          </a:p>
+        </p:txBody>
+      </p:sp>
+      <p:sp>
+        <p:nvSpPr>
+          <p:cNvPr id="14" name="Rectangle 13">
+            <a:extLst>
+              <a:ext uri="{FF2B5EF4-FFF2-40B4-BE49-F238E27FC236}">
+                <a16:creationId xmlns:a16="http://schemas.microsoft.com/office/drawing/2014/main" id="{B0E0A4E1-85D4-B65B-6A46-C4618C0923DF}"/>
+              </a:ext>
+              <a:ext uri="{C183D7F6-B498-43B3-948B-1728B52AA6E4}">
+                <adec:decorative xmlns:adec="http://schemas.microsoft.com/office/drawing/2017/decorative" val="1"/>
+              </a:ext>
+            </a:extLst>
+          </p:cNvPr>
+          <p:cNvSpPr>
+            <a:spLocks noGrp="1" noRot="1" noChangeAspect="1" noMove="1" noResize="1" noEditPoints="1" noAdjustHandles="1" noChangeArrowheads="1" noChangeShapeType="1" noTextEdit="1"/>
+          </p:cNvSpPr>
+          <p:nvPr>
+            <p:extLst>
+              <p:ext uri="{386F3935-93C4-4BCD-93E2-E3B085C9AB24}">
+                <p16:designElem xmlns:p16="http://schemas.microsoft.com/office/powerpoint/2015/main" val="1"/>
+              </p:ext>
+            </p:extLst>
+          </p:nvPr>
+        </p:nvSpPr>
+        <p:spPr>
+          <a:xfrm rot="5400000">
+            <a:off x="4136696" y="-3703868"/>
+            <a:ext cx="4374128" cy="11736479"/>
+          </a:xfrm>
+          <a:prstGeom prst="rect">
+            <a:avLst/>
+          </a:prstGeom>
+          <a:gradFill>
+            <a:gsLst>
+              <a:gs pos="17000">
+                <a:schemeClr val="accent1">
+                  <a:alpha val="0"/>
+                </a:schemeClr>
+              </a:gs>
+              <a:gs pos="100000">
+                <a:srgbClr val="000000">
+                  <a:alpha val="37000"/>
+                </a:srgbClr>
+              </a:gs>
+            </a:gsLst>
+            <a:lin ang="7800000" scaled="0"/>
+          </a:gradFill>
+          <a:ln>
+            <a:noFill/>
+          </a:ln>
+        </p:spPr>
+        <p:style>
+          <a:lnRef idx="2">
+            <a:schemeClr val="accent1">
+              <a:shade val="50000"/>
+            </a:schemeClr>
+          </a:lnRef>
+          <a:fillRef idx="1">
+            <a:schemeClr val="accent1"/>
+          </a:fillRef>
+          <a:effectRef idx="0">
+            <a:schemeClr val="accent1"/>
+          </a:effectRef>
+          <a:fontRef idx="minor">
+            <a:schemeClr val="lt1"/>
+          </a:fontRef>
+        </p:style>
+        <p:txBody>
+          <a:bodyPr rtlCol="0" anchor="ctr"/>
+          <a:lstStyle/>
+          <a:p>
+            <a:pPr algn="ctr"/>
+            <a:endParaRPr lang="en-US"/>
+          </a:p>
+        </p:txBody>
+      </p:sp>
+      <p:sp>
+        <p:nvSpPr>
+          <p:cNvPr id="16" name="Rectangle 15">
+            <a:extLst>
+              <a:ext uri="{FF2B5EF4-FFF2-40B4-BE49-F238E27FC236}">
+                <a16:creationId xmlns:a16="http://schemas.microsoft.com/office/drawing/2014/main" id="{36BC7374-2A43-F128-E31D-694DE9B58AA5}"/>
+              </a:ext>
+              <a:ext uri="{C183D7F6-B498-43B3-948B-1728B52AA6E4}">
+                <adec:decorative xmlns:adec="http://schemas.microsoft.com/office/drawing/2017/decorative" val="1"/>
+              </a:ext>
+            </a:extLst>
+          </p:cNvPr>
+          <p:cNvSpPr>
+            <a:spLocks noGrp="1" noRot="1" noChangeAspect="1" noMove="1" noResize="1" noEditPoints="1" noAdjustHandles="1" noChangeArrowheads="1" noChangeShapeType="1" noTextEdit="1"/>
+          </p:cNvSpPr>
+          <p:nvPr>
+            <p:extLst>
+              <p:ext uri="{386F3935-93C4-4BCD-93E2-E3B085C9AB24}">
+                <p16:designElem xmlns:p16="http://schemas.microsoft.com/office/powerpoint/2015/main" val="1"/>
+              </p:ext>
+            </p:extLst>
+          </p:nvPr>
+        </p:nvSpPr>
+        <p:spPr>
+          <a:xfrm>
+            <a:off x="-5" y="-22690"/>
+            <a:ext cx="8542485" cy="4374126"/>
+          </a:xfrm>
+          <a:prstGeom prst="rect">
+            <a:avLst/>
+          </a:prstGeom>
+          <a:gradFill>
+            <a:gsLst>
+              <a:gs pos="0">
+                <a:schemeClr val="accent1">
+                  <a:lumMod val="50000"/>
+                  <a:alpha val="0"/>
+                </a:schemeClr>
+              </a:gs>
+              <a:gs pos="100000">
+                <a:srgbClr val="000000">
+                  <a:alpha val="25000"/>
+                </a:srgbClr>
+              </a:gs>
+            </a:gsLst>
+            <a:lin ang="18600000" scaled="0"/>
+          </a:gradFill>
+          <a:ln>
+            <a:noFill/>
+          </a:ln>
+        </p:spPr>
+        <p:style>
+          <a:lnRef idx="2">
+            <a:schemeClr val="accent1">
+              <a:shade val="50000"/>
+            </a:schemeClr>
+          </a:lnRef>
+          <a:fillRef idx="1">
+            <a:schemeClr val="accent1"/>
+          </a:fillRef>
+          <a:effectRef idx="0">
+            <a:schemeClr val="accent1"/>
+          </a:effectRef>
+          <a:fontRef idx="minor">
+            <a:schemeClr val="lt1"/>
+          </a:fontRef>
+        </p:style>
+        <p:txBody>
+          <a:bodyPr rtlCol="0" anchor="ctr"/>
+          <a:lstStyle/>
+          <a:p>
+            <a:pPr algn="ctr"/>
+            <a:endParaRPr lang="en-US"/>
+          </a:p>
+        </p:txBody>
+      </p:sp>
+      <p:sp>
+        <p:nvSpPr>
+          <p:cNvPr id="18" name="Freeform: Shape 17">
+            <a:extLst>
+              <a:ext uri="{FF2B5EF4-FFF2-40B4-BE49-F238E27FC236}">
+                <a16:creationId xmlns:a16="http://schemas.microsoft.com/office/drawing/2014/main" id="{08ABE74F-476A-18DB-3F00-37FC490B016E}"/>
+              </a:ext>
+              <a:ext uri="{C183D7F6-B498-43B3-948B-1728B52AA6E4}">
+                <adec:decorative xmlns:adec="http://schemas.microsoft.com/office/drawing/2017/decorative" val="1"/>
+              </a:ext>
+            </a:extLst>
+          </p:cNvPr>
+          <p:cNvSpPr>
+            <a:spLocks noGrp="1" noRot="1" noChangeAspect="1" noMove="1" noResize="1" noEditPoints="1" noAdjustHandles="1" noChangeArrowheads="1" noChangeShapeType="1" noTextEdit="1"/>
+          </p:cNvSpPr>
+          <p:nvPr>
+            <p:extLst>
+              <p:ext uri="{386F3935-93C4-4BCD-93E2-E3B085C9AB24}">
+                <p16:designElem xmlns:p16="http://schemas.microsoft.com/office/powerpoint/2015/main" val="1"/>
+              </p:ext>
+            </p:extLst>
+          </p:nvPr>
+        </p:nvSpPr>
+        <p:spPr>
+          <a:xfrm rot="12508972">
+            <a:off x="5945431" y="-1032053"/>
+            <a:ext cx="4990147" cy="4439131"/>
+          </a:xfrm>
+          <a:custGeom>
+            <a:avLst/>
+            <a:gdLst>
+              <a:gd name="connsiteX0" fmla="*/ 4990147 w 4990147"/>
+              <a:gd name="connsiteY0" fmla="*/ 2229378 h 4439131"/>
+              <a:gd name="connsiteX1" fmla="*/ 917384 w 4990147"/>
+              <a:gd name="connsiteY1" fmla="*/ 4439131 h 4439131"/>
+              <a:gd name="connsiteX2" fmla="*/ 910814 w 4990147"/>
+              <a:gd name="connsiteY2" fmla="*/ 4434219 h 4439131"/>
+              <a:gd name="connsiteX3" fmla="*/ 0 w 4990147"/>
+              <a:gd name="connsiteY3" fmla="*/ 2502877 h 4439131"/>
+              <a:gd name="connsiteX4" fmla="*/ 2502877 w 4990147"/>
+              <a:gd name="connsiteY4" fmla="*/ 0 h 4439131"/>
+              <a:gd name="connsiteX5" fmla="*/ 4954904 w 4990147"/>
+              <a:gd name="connsiteY5" fmla="*/ 1998460 h 4439131"/>
+            </a:gdLst>
+            <a:ahLst/>
+            <a:cxnLst>
+              <a:cxn ang="0">
+                <a:pos x="connsiteX0" y="connsiteY0"/>
+              </a:cxn>
+              <a:cxn ang="0">
+                <a:pos x="connsiteX1" y="connsiteY1"/>
+              </a:cxn>
+              <a:cxn ang="0">
+                <a:pos x="connsiteX2" y="connsiteY2"/>
+              </a:cxn>
+              <a:cxn ang="0">
+                <a:pos x="connsiteX3" y="connsiteY3"/>
+              </a:cxn>
+              <a:cxn ang="0">
+                <a:pos x="connsiteX4" y="connsiteY4"/>
+              </a:cxn>
+              <a:cxn ang="0">
+                <a:pos x="connsiteX5" y="connsiteY5"/>
+              </a:cxn>
+            </a:cxnLst>
+            <a:rect l="l" t="t" r="r" b="b"/>
+            <a:pathLst>
+              <a:path w="4990147" h="4439131">
+                <a:moveTo>
+                  <a:pt x="4990147" y="2229378"/>
+                </a:moveTo>
+                <a:lnTo>
+                  <a:pt x="917384" y="4439131"/>
+                </a:lnTo>
+                <a:lnTo>
+                  <a:pt x="910814" y="4434219"/>
+                </a:lnTo>
+                <a:cubicBezTo>
+                  <a:pt x="354557" y="3975154"/>
+                  <a:pt x="0" y="3280421"/>
+                  <a:pt x="0" y="2502877"/>
+                </a:cubicBezTo>
+                <a:cubicBezTo>
+                  <a:pt x="0" y="1120576"/>
+                  <a:pt x="1120576" y="0"/>
+                  <a:pt x="2502877" y="0"/>
+                </a:cubicBezTo>
+                <a:cubicBezTo>
+                  <a:pt x="3712390" y="0"/>
+                  <a:pt x="4721520" y="857941"/>
+                  <a:pt x="4954904" y="1998460"/>
+                </a:cubicBezTo>
+                <a:close/>
+              </a:path>
+            </a:pathLst>
+          </a:custGeom>
+          <a:gradFill>
+            <a:gsLst>
+              <a:gs pos="0">
+                <a:schemeClr val="accent1">
+                  <a:alpha val="22000"/>
+                </a:schemeClr>
+              </a:gs>
+              <a:gs pos="87000">
+                <a:schemeClr val="accent1">
+                  <a:lumMod val="60000"/>
+                  <a:lumOff val="40000"/>
+                  <a:alpha val="2000"/>
+                </a:schemeClr>
+              </a:gs>
+            </a:gsLst>
+            <a:lin ang="8400000" scaled="0"/>
+          </a:gradFill>
+          <a:ln>
+            <a:noFill/>
+          </a:ln>
+        </p:spPr>
+        <p:style>
+          <a:lnRef idx="2">
+            <a:schemeClr val="accent1">
+              <a:shade val="50000"/>
+            </a:schemeClr>
+          </a:lnRef>
+          <a:fillRef idx="1">
+            <a:schemeClr val="accent1"/>
+          </a:fillRef>
+          <a:effectRef idx="0">
+            <a:schemeClr val="accent1"/>
+          </a:effectRef>
+          <a:fontRef idx="minor">
+            <a:schemeClr val="lt1"/>
+          </a:fontRef>
+        </p:style>
+        <p:txBody>
+          <a:bodyPr wrap="square" rtlCol="0" anchor="ctr">
+            <a:noAutofit/>
+          </a:bodyPr>
+          <a:lstStyle/>
+          <a:p>
+            <a:pPr algn="ctr"/>
+            <a:endParaRPr lang="en-US" dirty="0"/>
+          </a:p>
+        </p:txBody>
+      </p:sp>
+      <p:sp>
+        <p:nvSpPr>
+          <p:cNvPr id="2" name="Titel 1">
+            <a:extLst>
+              <a:ext uri="{FF2B5EF4-FFF2-40B4-BE49-F238E27FC236}">
+                <a16:creationId xmlns:a16="http://schemas.microsoft.com/office/drawing/2014/main" id="{56851579-0AFE-DF38-E6A6-E6D1B32F8808}"/>
+              </a:ext>
+            </a:extLst>
+          </p:cNvPr>
+          <p:cNvSpPr>
+            <a:spLocks noGrp="1"/>
+          </p:cNvSpPr>
+          <p:nvPr>
+            <p:ph type="ctrTitle"/>
+          </p:nvPr>
+        </p:nvSpPr>
+        <p:spPr>
+          <a:xfrm>
+            <a:off x="1314824" y="735106"/>
+            <a:ext cx="10053763" cy="2928470"/>
+          </a:xfrm>
+        </p:spPr>
+        <p:txBody>
+          <a:bodyPr anchor="b">
+            <a:normAutofit/>
+          </a:bodyPr>
+          <a:lstStyle/>
+          <a:p>
+            <a:pPr algn="l"/>
+            <a:r>
+              <a:rPr lang="de-DE" sz="4800" dirty="0">
+                <a:solidFill>
+                  <a:srgbClr val="FFFFFF"/>
+                </a:solidFill>
+              </a:rPr>
+              <a:t>Dinge die man beachten sollte</a:t>
+            </a:r>
+          </a:p>
+        </p:txBody>
+      </p:sp>
+      <p:sp>
+        <p:nvSpPr>
+          <p:cNvPr id="3" name="Untertitel 2">
+            <a:extLst>
+              <a:ext uri="{FF2B5EF4-FFF2-40B4-BE49-F238E27FC236}">
+                <a16:creationId xmlns:a16="http://schemas.microsoft.com/office/drawing/2014/main" id="{49DF54B5-054C-5FA8-BDB6-BC8F245C088F}"/>
+              </a:ext>
+            </a:extLst>
+          </p:cNvPr>
+          <p:cNvSpPr>
+            <a:spLocks noGrp="1"/>
+          </p:cNvSpPr>
+          <p:nvPr>
+            <p:ph type="subTitle" idx="1"/>
+          </p:nvPr>
+        </p:nvSpPr>
+        <p:spPr>
+          <a:xfrm>
+            <a:off x="1350682" y="4870824"/>
+            <a:ext cx="10005951" cy="1458258"/>
+          </a:xfrm>
+        </p:spPr>
+        <p:txBody>
+          <a:bodyPr anchor="ctr">
+            <a:normAutofit/>
+          </a:bodyPr>
+          <a:lstStyle/>
+          <a:p>
+            <a:pPr algn="l"/>
+            <a:endParaRPr lang="de-DE"/>
+          </a:p>
+        </p:txBody>
+      </p:sp>
+    </p:spTree>
+    <p:extLst>
+      <p:ext uri="{BB962C8B-B14F-4D97-AF65-F5344CB8AC3E}">
+        <p14:creationId xmlns:p14="http://schemas.microsoft.com/office/powerpoint/2010/main" val="3810922920"/>
+      </p:ext>
+    </p:extLst>
+  </p:cSld>
+  <p:clrMapOvr>
+    <a:masterClrMapping/>
+  </p:clrMapOvr>
+</p:sld>
+</file>
+
+<file path=ppt/slides/slide29.xml><?xml version="1.0" encoding="utf-8"?>
+<p:sld xmlns:a="http://schemas.openxmlformats.org/drawingml/2006/main" xmlns:r="http://schemas.openxmlformats.org/officeDocument/2006/relationships" xmlns:p="http://schemas.openxmlformats.org/presentationml/2006/main">
+  <p:cSld>
+    <p:spTree>
+      <p:nvGrpSpPr>
+        <p:cNvPr id="1" name=""/>
+        <p:cNvGrpSpPr/>
+        <p:nvPr/>
+      </p:nvGrpSpPr>
+      <p:grpSpPr>
+        <a:xfrm>
+          <a:off x="0" y="0"/>
+          <a:ext cx="0" cy="0"/>
+          <a:chOff x="0" y="0"/>
+          <a:chExt cx="0" cy="0"/>
+        </a:xfrm>
+      </p:grpSpPr>
+      <p:sp>
+        <p:nvSpPr>
+          <p:cNvPr id="2" name="Titel 1">
+            <a:extLst>
+              <a:ext uri="{FF2B5EF4-FFF2-40B4-BE49-F238E27FC236}">
+                <a16:creationId xmlns:a16="http://schemas.microsoft.com/office/drawing/2014/main" id="{46955601-66C0-48A8-72B3-D8AF867B6672}"/>
+              </a:ext>
+            </a:extLst>
+          </p:cNvPr>
+          <p:cNvSpPr>
+            <a:spLocks noGrp="1"/>
+          </p:cNvSpPr>
+          <p:nvPr>
+            <p:ph type="title"/>
+          </p:nvPr>
+        </p:nvSpPr>
+        <p:spPr/>
+        <p:txBody>
+          <a:bodyPr/>
+          <a:lstStyle/>
+          <a:p>
+            <a:r>
+              <a:rPr lang="de-DE" dirty="0"/>
+              <a:t>Bitte beachten:</a:t>
+            </a:r>
+          </a:p>
+        </p:txBody>
+      </p:sp>
+      <p:sp>
+        <p:nvSpPr>
+          <p:cNvPr id="3" name="Inhaltsplatzhalter 2">
+            <a:extLst>
+              <a:ext uri="{FF2B5EF4-FFF2-40B4-BE49-F238E27FC236}">
+                <a16:creationId xmlns:a16="http://schemas.microsoft.com/office/drawing/2014/main" id="{C78D6870-A100-0BD8-E02F-7D7D1237589B}"/>
+              </a:ext>
+            </a:extLst>
+          </p:cNvPr>
+          <p:cNvSpPr>
+            <a:spLocks noGrp="1"/>
+          </p:cNvSpPr>
+          <p:nvPr>
+            <p:ph idx="1"/>
+          </p:nvPr>
+        </p:nvSpPr>
+        <p:spPr/>
+        <p:txBody>
+          <a:bodyPr/>
+          <a:lstStyle/>
+          <a:p>
+            <a:r>
+              <a:rPr lang="de-DE" b="1" dirty="0"/>
+              <a:t>Keine Sonderzeichen in Dateinamen und Variablennamen</a:t>
+            </a:r>
+          </a:p>
+          <a:p>
+            <a:pPr lvl="1"/>
+            <a:r>
+              <a:rPr lang="de-DE" dirty="0"/>
+              <a:t>Auch nicht </a:t>
+            </a:r>
+            <a:r>
+              <a:rPr lang="de-DE" dirty="0" err="1"/>
+              <a:t>äöüß</a:t>
+            </a:r>
+            <a:endParaRPr lang="de-DE" dirty="0"/>
+          </a:p>
+          <a:p>
+            <a:pPr lvl="1"/>
+            <a:r>
+              <a:rPr lang="de-DE" dirty="0"/>
+              <a:t>Fast immer nur ASCII Zeichen möglich</a:t>
+            </a:r>
+          </a:p>
+          <a:p>
+            <a:r>
+              <a:rPr lang="de-DE" b="1" dirty="0"/>
+              <a:t>Sprechende Namen verwenden</a:t>
+            </a:r>
+          </a:p>
+          <a:p>
+            <a:pPr lvl="1"/>
+            <a:r>
+              <a:rPr lang="de-DE" dirty="0"/>
+              <a:t>Nicht a1, a2, …</a:t>
+            </a:r>
+          </a:p>
+          <a:p>
+            <a:r>
+              <a:rPr lang="de-DE" b="1" dirty="0"/>
+              <a:t>[Einheitliche Namenskonventionen]</a:t>
+            </a:r>
+          </a:p>
+          <a:p>
+            <a:endParaRPr lang="de-DE" dirty="0"/>
+          </a:p>
+          <a:p>
+            <a:endParaRPr lang="de-DE" dirty="0"/>
+          </a:p>
+        </p:txBody>
+      </p:sp>
+    </p:spTree>
+    <p:extLst>
+      <p:ext uri="{BB962C8B-B14F-4D97-AF65-F5344CB8AC3E}">
+        <p14:creationId xmlns:p14="http://schemas.microsoft.com/office/powerpoint/2010/main" val="3150245681"/>
       </p:ext>
     </p:extLst>
   </p:cSld>

</xml_diff>